<commit_message>
renamed a few variables in the examples for clarity and consistency
</commit_message>
<xml_diff>
--- a/PowerPoint Slides/14 - Arrays.pptx
+++ b/PowerPoint Slides/14 - Arrays.pptx
@@ -31,7 +31,7 @@
     <p:sldId id="271" r:id="rId19"/>
   </p:sldIdLst>
   <p:sldSz cx="9144000" cy="6858000" type="screen4x3"/>
-  <p:notesSz cx="7010400" cy="9296400"/>
+  <p:notesSz cx="7315200" cy="9601200"/>
   <p:defaultTextStyle>
     <a:defPPr>
       <a:defRPr lang="en-US"/>
@@ -174,12 +174,12 @@
     </p:ext>
     <p:ext uri="{2D200454-40CA-4A62-9FC3-DE9A4176ACB9}">
       <p15:notesGuideLst xmlns:p15="http://schemas.microsoft.com/office/powerpoint/2012/main">
-        <p15:guide id="1" orient="horz" pos="2928" userDrawn="1">
+        <p15:guide id="1" orient="horz" pos="3024" userDrawn="1">
           <p15:clr>
             <a:srgbClr val="A4A3A4"/>
           </p15:clr>
         </p15:guide>
-        <p15:guide id="2" pos="2208" userDrawn="1">
+        <p15:guide id="2" pos="2304" userDrawn="1">
           <p15:clr>
             <a:srgbClr val="A4A3A4"/>
           </p15:clr>
@@ -227,8 +227,8 @@
         </p:nvSpPr>
         <p:spPr bwMode="auto">
           <a:xfrm>
-            <a:off x="3971182" y="0"/>
-            <a:ext cx="3039218" cy="465774"/>
+            <a:off x="4143842" y="0"/>
+            <a:ext cx="3171358" cy="481045"/>
           </a:xfrm>
           <a:prstGeom prst="rect">
             <a:avLst/>
@@ -243,13 +243,13 @@
           <a:effectLst/>
         </p:spPr>
         <p:txBody>
-          <a:bodyPr vert="horz" wrap="square" lIns="93168" tIns="46584" rIns="93168" bIns="46584" numCol="1" anchor="t" anchorCtr="0" compatLnSpc="1">
+          <a:bodyPr vert="horz" wrap="square" lIns="96643" tIns="48322" rIns="96643" bIns="48322" numCol="1" anchor="t" anchorCtr="0" compatLnSpc="1">
             <a:prstTxWarp prst="textNoShape">
               <a:avLst/>
             </a:prstTxWarp>
           </a:bodyPr>
           <a:lstStyle>
-            <a:lvl1pPr algn="r" defTabSz="931670">
+            <a:lvl1pPr algn="r" defTabSz="966421">
               <a:defRPr sz="1200"/>
             </a:lvl1pPr>
           </a:lstStyle>
@@ -278,8 +278,8 @@
         </p:nvSpPr>
         <p:spPr bwMode="auto">
           <a:xfrm>
-            <a:off x="3971182" y="8830629"/>
-            <a:ext cx="3039218" cy="465773"/>
+            <a:off x="4143842" y="9120158"/>
+            <a:ext cx="3171358" cy="481044"/>
           </a:xfrm>
           <a:prstGeom prst="rect">
             <a:avLst/>
@@ -294,13 +294,13 @@
           <a:effectLst/>
         </p:spPr>
         <p:txBody>
-          <a:bodyPr vert="horz" wrap="square" lIns="93168" tIns="46584" rIns="93168" bIns="46584" numCol="1" anchor="b" anchorCtr="0" compatLnSpc="1">
+          <a:bodyPr vert="horz" wrap="square" lIns="96643" tIns="48322" rIns="96643" bIns="48322" numCol="1" anchor="b" anchorCtr="0" compatLnSpc="1">
             <a:prstTxWarp prst="textNoShape">
               <a:avLst/>
             </a:prstTxWarp>
           </a:bodyPr>
           <a:lstStyle>
-            <a:lvl1pPr algn="r" defTabSz="931670">
+            <a:lvl1pPr algn="r" defTabSz="966421">
               <a:defRPr sz="1200"/>
             </a:lvl1pPr>
           </a:lstStyle>
@@ -378,8 +378,8 @@
         </p:nvSpPr>
         <p:spPr bwMode="auto">
           <a:xfrm>
-            <a:off x="2" y="0"/>
-            <a:ext cx="3039219" cy="465774"/>
+            <a:off x="3" y="0"/>
+            <a:ext cx="3171359" cy="481045"/>
           </a:xfrm>
           <a:prstGeom prst="rect">
             <a:avLst/>
@@ -394,13 +394,13 @@
           <a:effectLst/>
         </p:spPr>
         <p:txBody>
-          <a:bodyPr vert="horz" wrap="square" lIns="93168" tIns="46584" rIns="93168" bIns="46584" numCol="1" anchor="t" anchorCtr="0" compatLnSpc="1">
+          <a:bodyPr vert="horz" wrap="square" lIns="96643" tIns="48322" rIns="96643" bIns="48322" numCol="1" anchor="t" anchorCtr="0" compatLnSpc="1">
             <a:prstTxWarp prst="textNoShape">
               <a:avLst/>
             </a:prstTxWarp>
           </a:bodyPr>
           <a:lstStyle>
-            <a:lvl1pPr algn="l" defTabSz="931670">
+            <a:lvl1pPr algn="l" defTabSz="966421">
               <a:defRPr sz="1200"/>
             </a:lvl1pPr>
           </a:lstStyle>
@@ -427,8 +427,8 @@
         </p:nvSpPr>
         <p:spPr bwMode="auto">
           <a:xfrm>
-            <a:off x="3971182" y="0"/>
-            <a:ext cx="3039218" cy="465774"/>
+            <a:off x="4143842" y="0"/>
+            <a:ext cx="3171358" cy="481045"/>
           </a:xfrm>
           <a:prstGeom prst="rect">
             <a:avLst/>
@@ -443,13 +443,13 @@
           <a:effectLst/>
         </p:spPr>
         <p:txBody>
-          <a:bodyPr vert="horz" wrap="square" lIns="93168" tIns="46584" rIns="93168" bIns="46584" numCol="1" anchor="t" anchorCtr="0" compatLnSpc="1">
+          <a:bodyPr vert="horz" wrap="square" lIns="96643" tIns="48322" rIns="96643" bIns="48322" numCol="1" anchor="t" anchorCtr="0" compatLnSpc="1">
             <a:prstTxWarp prst="textNoShape">
               <a:avLst/>
             </a:prstTxWarp>
           </a:bodyPr>
           <a:lstStyle>
-            <a:lvl1pPr algn="r" defTabSz="931670">
+            <a:lvl1pPr algn="r" defTabSz="966421">
               <a:defRPr sz="1200"/>
             </a:lvl1pPr>
           </a:lstStyle>
@@ -473,8 +473,8 @@
         </p:nvSpPr>
         <p:spPr bwMode="auto">
           <a:xfrm>
-            <a:off x="1181100" y="696913"/>
-            <a:ext cx="4648200" cy="3486150"/>
+            <a:off x="1257300" y="719138"/>
+            <a:ext cx="4800600" cy="3600450"/>
           </a:xfrm>
           <a:prstGeom prst="rect">
             <a:avLst/>
@@ -502,8 +502,8 @@
         </p:nvSpPr>
         <p:spPr bwMode="auto">
           <a:xfrm>
-            <a:off x="935144" y="4416108"/>
-            <a:ext cx="5140112" cy="4184016"/>
+            <a:off x="975803" y="4560898"/>
+            <a:ext cx="5363595" cy="4321197"/>
           </a:xfrm>
           <a:prstGeom prst="rect">
             <a:avLst/>
@@ -518,7 +518,7 @@
           <a:effectLst/>
         </p:spPr>
         <p:txBody>
-          <a:bodyPr vert="horz" wrap="square" lIns="93168" tIns="46584" rIns="93168" bIns="46584" numCol="1" anchor="t" anchorCtr="0" compatLnSpc="1">
+          <a:bodyPr vert="horz" wrap="square" lIns="96643" tIns="48322" rIns="96643" bIns="48322" numCol="1" anchor="t" anchorCtr="0" compatLnSpc="1">
             <a:prstTxWarp prst="textNoShape">
               <a:avLst/>
             </a:prstTxWarp>
@@ -573,8 +573,8 @@
         </p:nvSpPr>
         <p:spPr bwMode="auto">
           <a:xfrm>
-            <a:off x="2" y="8830629"/>
-            <a:ext cx="3039219" cy="465773"/>
+            <a:off x="3" y="9120158"/>
+            <a:ext cx="3171359" cy="481044"/>
           </a:xfrm>
           <a:prstGeom prst="rect">
             <a:avLst/>
@@ -589,13 +589,13 @@
           <a:effectLst/>
         </p:spPr>
         <p:txBody>
-          <a:bodyPr vert="horz" wrap="square" lIns="93168" tIns="46584" rIns="93168" bIns="46584" numCol="1" anchor="b" anchorCtr="0" compatLnSpc="1">
+          <a:bodyPr vert="horz" wrap="square" lIns="96643" tIns="48322" rIns="96643" bIns="48322" numCol="1" anchor="b" anchorCtr="0" compatLnSpc="1">
             <a:prstTxWarp prst="textNoShape">
               <a:avLst/>
             </a:prstTxWarp>
           </a:bodyPr>
           <a:lstStyle>
-            <a:lvl1pPr algn="l" defTabSz="931670">
+            <a:lvl1pPr algn="l" defTabSz="966421">
               <a:defRPr sz="1200"/>
             </a:lvl1pPr>
           </a:lstStyle>
@@ -619,8 +619,8 @@
         </p:nvSpPr>
         <p:spPr bwMode="auto">
           <a:xfrm>
-            <a:off x="3971182" y="8830629"/>
-            <a:ext cx="3039218" cy="465773"/>
+            <a:off x="4143842" y="9120158"/>
+            <a:ext cx="3171358" cy="481044"/>
           </a:xfrm>
           <a:prstGeom prst="rect">
             <a:avLst/>
@@ -635,13 +635,13 @@
           <a:effectLst/>
         </p:spPr>
         <p:txBody>
-          <a:bodyPr vert="horz" wrap="square" lIns="93168" tIns="46584" rIns="93168" bIns="46584" numCol="1" anchor="b" anchorCtr="0" compatLnSpc="1">
+          <a:bodyPr vert="horz" wrap="square" lIns="96643" tIns="48322" rIns="96643" bIns="48322" numCol="1" anchor="b" anchorCtr="0" compatLnSpc="1">
             <a:prstTxWarp prst="textNoShape">
               <a:avLst/>
             </a:prstTxWarp>
           </a:bodyPr>
           <a:lstStyle>
-            <a:lvl1pPr algn="r" defTabSz="931670">
+            <a:lvl1pPr algn="r" defTabSz="966421">
               <a:defRPr sz="1200"/>
             </a:lvl1pPr>
           </a:lstStyle>
@@ -1449,7 +1449,7 @@
           <a:bodyPr/>
           <a:lstStyle/>
           <a:p>
-            <a:pPr defTabSz="931774"/>
+            <a:pPr defTabSz="966529"/>
             <a:r>
               <a:rPr lang="en-US" dirty="0"/>
               <a:t>Constraint Analysis</a:t>
@@ -1474,10 +1474,10 @@
           <a:bodyPr/>
           <a:lstStyle/>
           <a:p>
-            <a:pPr defTabSz="931774"/>
+            <a:pPr defTabSz="966529"/>
             <a:fld id="{55111D70-59CA-4E73-90CB-ABA757279DF6}" type="slidenum">
               <a:rPr lang="en-US" smtClean="0"/>
-              <a:pPr defTabSz="931774"/>
+              <a:pPr defTabSz="966529"/>
               <a:t>15</a:t>
             </a:fld>
             <a:endParaRPr lang="en-US" dirty="0"/>
@@ -8692,18 +8692,11 @@
               <a:buNone/>
             </a:pPr>
             <a:r>
-              <a:rPr lang="en-US" sz="1800" dirty="0" err="1">
-                <a:latin typeface="Consolas" pitchFamily="49" charset="0"/>
-                <a:cs typeface="Consolas" pitchFamily="49" charset="0"/>
-              </a:rPr>
-              <a:t>var</a:t>
-            </a:r>
-            <a:r>
               <a:rPr lang="en-US" sz="1800" dirty="0">
                 <a:latin typeface="Consolas" pitchFamily="49" charset="0"/>
                 <a:cs typeface="Consolas" pitchFamily="49" charset="0"/>
               </a:rPr>
-              <a:t> b1 : T2;  // contains 10 arrays of integers;</a:t>
+              <a:t>var a2 : T2;  // contains 10 arrays of integers;</a:t>
             </a:r>
           </a:p>
           <a:p>
@@ -8780,7 +8773,7 @@
                 <a:latin typeface="Consolas" pitchFamily="49" charset="0"/>
                 <a:cs typeface="Consolas" pitchFamily="49" charset="0"/>
               </a:rPr>
-              <a:t>b1[3]     // the array at index 3 of b1 (the fourth array)</a:t>
+              <a:t>a2[3]     // the array at index 3 of a2 (the fourth array)</a:t>
             </a:r>
           </a:p>
           <a:p>
@@ -8796,7 +8789,7 @@
                 <a:latin typeface="Consolas" pitchFamily="49" charset="0"/>
                 <a:cs typeface="Consolas" pitchFamily="49" charset="0"/>
               </a:rPr>
-              <a:t>b1[4][3]  // the integer at index 3 of the array</a:t>
+              <a:t>a2[4][3]  // the integer at index 3 of the array</a:t>
             </a:r>
           </a:p>
           <a:p>
@@ -8812,7 +8805,7 @@
                 <a:latin typeface="Consolas" pitchFamily="49" charset="0"/>
                 <a:cs typeface="Consolas" pitchFamily="49" charset="0"/>
               </a:rPr>
-              <a:t>          // at index 4 of b1</a:t>
+              <a:t>          // at index 4 of a2</a:t>
             </a:r>
           </a:p>
         </p:txBody>
@@ -9136,18 +9129,11 @@
               <a:buNone/>
             </a:pPr>
             <a:r>
-              <a:rPr lang="en-US" sz="1800" dirty="0" err="1">
-                <a:latin typeface="Consolas" pitchFamily="49" charset="0"/>
-                <a:cs typeface="Consolas" pitchFamily="49" charset="0"/>
-              </a:rPr>
-              <a:t>var</a:t>
-            </a:r>
-            <a:r>
               <a:rPr lang="en-US" sz="1800" dirty="0">
                 <a:latin typeface="Consolas" pitchFamily="49" charset="0"/>
                 <a:cs typeface="Consolas" pitchFamily="49" charset="0"/>
               </a:rPr>
-              <a:t> a1 : T1;</a:t>
+              <a:t>var a1  : T1;</a:t>
             </a:r>
           </a:p>
           <a:p>
@@ -9158,18 +9144,11 @@
               <a:buNone/>
             </a:pPr>
             <a:r>
-              <a:rPr lang="en-US" sz="1800" dirty="0" err="1">
-                <a:latin typeface="Consolas" pitchFamily="49" charset="0"/>
-                <a:cs typeface="Consolas" pitchFamily="49" charset="0"/>
-              </a:rPr>
-              <a:t>var</a:t>
-            </a:r>
-            <a:r>
               <a:rPr lang="en-US" sz="1800" dirty="0">
                 <a:latin typeface="Consolas" pitchFamily="49" charset="0"/>
                 <a:cs typeface="Consolas" pitchFamily="49" charset="0"/>
               </a:rPr>
-              <a:t> a2 : T1;   // a2 has the same type as a1</a:t>
+              <a:t>var a1x : T1;   // a1x has the same type as a1</a:t>
             </a:r>
           </a:p>
           <a:p>
@@ -9180,18 +9159,11 @@
               <a:buNone/>
             </a:pPr>
             <a:r>
-              <a:rPr lang="en-US" sz="1800" dirty="0" err="1">
-                <a:latin typeface="Consolas" pitchFamily="49" charset="0"/>
-                <a:cs typeface="Consolas" pitchFamily="49" charset="0"/>
-              </a:rPr>
-              <a:t>var</a:t>
-            </a:r>
-            <a:r>
               <a:rPr lang="en-US" sz="1800" dirty="0">
                 <a:latin typeface="Consolas" pitchFamily="49" charset="0"/>
                 <a:cs typeface="Consolas" pitchFamily="49" charset="0"/>
               </a:rPr>
-              <a:t> b1 : T2;</a:t>
+              <a:t>var a2  : T2;</a:t>
             </a:r>
           </a:p>
           <a:p>
@@ -9202,18 +9174,11 @@
               <a:buNone/>
             </a:pPr>
             <a:r>
-              <a:rPr lang="en-US" sz="1800" dirty="0" err="1">
-                <a:latin typeface="Consolas" pitchFamily="49" charset="0"/>
-                <a:cs typeface="Consolas" pitchFamily="49" charset="0"/>
-              </a:rPr>
-              <a:t>var</a:t>
-            </a:r>
-            <a:r>
               <a:rPr lang="en-US" sz="1800" dirty="0">
                 <a:latin typeface="Consolas" pitchFamily="49" charset="0"/>
                 <a:cs typeface="Consolas" pitchFamily="49" charset="0"/>
               </a:rPr>
-              <a:t> b2 : T2;   // b2 has the same type as b1</a:t>
+              <a:t>var a2x : T2;   // a2x has the same type as a2</a:t>
             </a:r>
           </a:p>
           <a:p>
@@ -9224,18 +9189,11 @@
               <a:buNone/>
             </a:pPr>
             <a:r>
-              <a:rPr lang="en-US" sz="1800" dirty="0" err="1">
-                <a:latin typeface="Consolas" pitchFamily="49" charset="0"/>
-                <a:cs typeface="Consolas" pitchFamily="49" charset="0"/>
-              </a:rPr>
-              <a:t>var</a:t>
-            </a:r>
-            <a:r>
               <a:rPr lang="en-US" sz="1800" dirty="0">
                 <a:latin typeface="Consolas" pitchFamily="49" charset="0"/>
                 <a:cs typeface="Consolas" pitchFamily="49" charset="0"/>
               </a:rPr>
-              <a:t> c1 : T3;   // c1 does not have the same type as a1</a:t>
+              <a:t>var a3  : T3;   // a3 does not have the same type as a1</a:t>
             </a:r>
           </a:p>
           <a:p>
@@ -9277,7 +9235,7 @@
                 <a:latin typeface="Consolas" pitchFamily="49" charset="0"/>
                 <a:cs typeface="Consolas" pitchFamily="49" charset="0"/>
               </a:rPr>
-              <a:t>a1 := a2;   // legal (same types)</a:t>
+              <a:t>a1 := a1x;   // legal (same types)</a:t>
             </a:r>
           </a:p>
           <a:p>
@@ -9292,19 +9250,8 @@
                 <a:latin typeface="Consolas" pitchFamily="49" charset="0"/>
                 <a:cs typeface="Consolas" pitchFamily="49" charset="0"/>
               </a:rPr>
-              <a:t>b1 := b2;   // legal (</a:t>
-            </a:r>
-            <a:r>
-              <a:rPr lang="en-US" sz="1800">
-                <a:latin typeface="Consolas" pitchFamily="49" charset="0"/>
-                <a:cs typeface="Consolas" pitchFamily="49" charset="0"/>
-              </a:rPr>
-              <a:t>same types)</a:t>
-            </a:r>
-            <a:endParaRPr lang="en-US" sz="1800" dirty="0">
-              <a:latin typeface="Consolas" pitchFamily="49" charset="0"/>
-              <a:cs typeface="Consolas" pitchFamily="49" charset="0"/>
-            </a:endParaRPr>
+              <a:t>a2 := a2x;   // legal (same types)</a:t>
+            </a:r>
           </a:p>
           <a:p>
             <a:pPr marL="274320" lvl="1" indent="0">
@@ -9318,7 +9265,7 @@
                 <a:latin typeface="Consolas" pitchFamily="49" charset="0"/>
                 <a:cs typeface="Consolas" pitchFamily="49" charset="0"/>
               </a:rPr>
-              <a:t>a1 := c1;   // *** Illegal in CPRL (different types) ***</a:t>
+              <a:t>a1 := a3;    // *** Illegal in CPRL (different types) ***</a:t>
             </a:r>
           </a:p>
         </p:txBody>
@@ -10687,18 +10634,11 @@
               <a:buNone/>
             </a:pPr>
             <a:r>
-              <a:rPr lang="en-US" sz="1800" dirty="0" err="1">
-                <a:latin typeface="Consolas" pitchFamily="49" charset="0"/>
-                <a:cs typeface="Consolas" pitchFamily="49" charset="0"/>
-              </a:rPr>
-              <a:t>var</a:t>
-            </a:r>
-            <a:r>
               <a:rPr lang="en-US" sz="1800" dirty="0">
                 <a:latin typeface="Consolas" pitchFamily="49" charset="0"/>
                 <a:cs typeface="Consolas" pitchFamily="49" charset="0"/>
               </a:rPr>
-              <a:t>  b1, b2 : T2;</a:t>
+              <a:t>var  x, y : T2;</a:t>
             </a:r>
           </a:p>
           <a:p>
@@ -10740,7 +10680,7 @@
                 <a:latin typeface="Consolas" pitchFamily="49" charset="0"/>
                 <a:cs typeface="Consolas" pitchFamily="49" charset="0"/>
               </a:rPr>
-              <a:t>b1 := b2;              // array assignment (type T2)</a:t>
+              <a:t>x := y;                // array assignment (type T2)</a:t>
             </a:r>
           </a:p>
           <a:p>
@@ -10782,7 +10722,7 @@
                 <a:latin typeface="Consolas" pitchFamily="49" charset="0"/>
                 <a:cs typeface="Consolas" pitchFamily="49" charset="0"/>
               </a:rPr>
-              <a:t>b1[2] := b2[5];        // array assignment (type T1)</a:t>
+              <a:t>x[2] := y[5];          // array assignment (type T1)</a:t>
             </a:r>
           </a:p>
           <a:p>
@@ -10824,7 +10764,7 @@
                 <a:latin typeface="Consolas" pitchFamily="49" charset="0"/>
                 <a:cs typeface="Consolas" pitchFamily="49" charset="0"/>
               </a:rPr>
-              <a:t>b1[2][7] := b2[5][0]   // Integer assignment</a:t>
+              <a:t>x[2][7] := y[5][0]     // Integer assignment</a:t>
             </a:r>
           </a:p>
           <a:p>

</xml_diff>